<commit_message>
added fecha to alquiler
</commit_message>
<xml_diff>
--- a/base_de_datos_I/clases_practicas/LAB_03 (solution).pptx
+++ b/base_de_datos_I/clases_practicas/LAB_03 (solution).pptx
@@ -15,7 +15,6 @@
     <p:sldId id="265" r:id="rId8"/>
     <p:sldId id="266" r:id="rId9"/>
     <p:sldId id="267" r:id="rId10"/>
-    <p:sldId id="269" r:id="rId11"/>
   </p:sldIdLst>
   <p:sldSz cx="9144000" cy="6858000" type="screen4x3"/>
   <p:notesSz cx="6858000" cy="9144000"/>
@@ -11445,7 +11444,7 @@
         <p:spPr>
           <a:xfrm>
             <a:off x="1128395" y="433070"/>
-            <a:ext cx="5530215" cy="991235"/>
+            <a:ext cx="5530215" cy="1604010"/>
           </a:xfrm>
           <a:prstGeom prst="rect">
             <a:avLst/>
@@ -11835,7 +11834,7 @@
         </p:nvSpPr>
         <p:spPr>
           <a:xfrm>
-            <a:off x="1398270" y="1860550"/>
+            <a:off x="1398270" y="2141220"/>
             <a:ext cx="1132840" cy="462915"/>
           </a:xfrm>
           <a:prstGeom prst="diamond">
@@ -12136,7 +12135,7 @@
         </p:nvSpPr>
         <p:spPr>
           <a:xfrm>
-            <a:off x="5238750" y="1952625"/>
+            <a:off x="5238750" y="2233295"/>
             <a:ext cx="1249045" cy="513080"/>
           </a:xfrm>
           <a:prstGeom prst="rect">
@@ -12179,7 +12178,7 @@
         </p:nvSpPr>
         <p:spPr>
           <a:xfrm>
-            <a:off x="6971665" y="2017395"/>
+            <a:off x="6971665" y="2298065"/>
             <a:ext cx="1019175" cy="383540"/>
           </a:xfrm>
           <a:prstGeom prst="diamond">
@@ -12445,7 +12444,7 @@
         <p:spPr>
           <a:xfrm>
             <a:off x="2588895" y="977900"/>
-            <a:ext cx="374650" cy="275590"/>
+            <a:ext cx="375920" cy="275590"/>
           </a:xfrm>
           <a:prstGeom prst="rect">
             <a:avLst/>
@@ -12459,7 +12458,7 @@
           <a:p>
             <a:r>
               <a:rPr lang="en-US" sz="1200"/>
-              <a:t>0,*</a:t>
+              <a:t>0,1</a:t>
             </a:r>
             <a:endParaRPr lang="en-US" sz="1200"/>
           </a:p>
@@ -12864,8 +12863,8 @@
         </p:nvCxnSpPr>
         <p:spPr>
           <a:xfrm>
-            <a:off x="1964690" y="2323465"/>
-            <a:ext cx="0" cy="901065"/>
+            <a:off x="1964690" y="2604135"/>
+            <a:ext cx="0" cy="620395"/>
           </a:xfrm>
           <a:prstGeom prst="line">
             <a:avLst/>
@@ -12904,7 +12903,7 @@
         <p:spPr>
           <a:xfrm flipH="1" flipV="1">
             <a:off x="1964055" y="1221740"/>
-            <a:ext cx="635" cy="638810"/>
+            <a:ext cx="635" cy="919480"/>
           </a:xfrm>
           <a:prstGeom prst="line">
             <a:avLst/>
@@ -13001,7 +13000,7 @@
         <p:spPr>
           <a:xfrm>
             <a:off x="5863590" y="1225550"/>
-            <a:ext cx="0" cy="727075"/>
+            <a:ext cx="0" cy="1007745"/>
           </a:xfrm>
           <a:prstGeom prst="line">
             <a:avLst/>
@@ -13080,7 +13079,7 @@
         </p:nvCxnSpPr>
         <p:spPr>
           <a:xfrm>
-            <a:off x="6487795" y="2209165"/>
+            <a:off x="6487795" y="2489835"/>
             <a:ext cx="483870" cy="0"/>
           </a:xfrm>
           <a:prstGeom prst="line">
@@ -13119,8 +13118,8 @@
         </p:nvCxnSpPr>
         <p:spPr>
           <a:xfrm flipV="1">
-            <a:off x="7473950" y="2400935"/>
-            <a:ext cx="7620" cy="641350"/>
+            <a:off x="7473950" y="2681605"/>
+            <a:ext cx="7620" cy="360680"/>
           </a:xfrm>
           <a:prstGeom prst="line">
             <a:avLst/>
@@ -13155,7 +13154,7 @@
         </p:nvSpPr>
         <p:spPr>
           <a:xfrm>
-            <a:off x="6450330" y="2209165"/>
+            <a:off x="6450330" y="2489835"/>
             <a:ext cx="374650" cy="275590"/>
           </a:xfrm>
           <a:prstGeom prst="rect">
@@ -13756,24 +13755,117 @@
           </a:p>
         </p:txBody>
       </p:sp>
-    </p:spTree>
-  </p:cSld>
-  <p:clrMapOvr>
-    <a:masterClrMapping/>
-  </p:clrMapOvr>
-</p:sld>
-</file>
-
-<file path=ppt/slides/slide8.xml><?xml version="1.0" encoding="utf-8"?>
-<p:sld xmlns:a="http://schemas.openxmlformats.org/drawingml/2006/main" xmlns:r="http://schemas.openxmlformats.org/officeDocument/2006/relationships" xmlns:p="http://schemas.openxmlformats.org/presentationml/2006/main">
-  <p:cSld>
-    <p:spTree>
-      <p:nvGrpSpPr>
-        <p:cNvPr id="1" name=""/>
-        <p:cNvGrpSpPr/>
-        <p:nvPr/>
-      </p:nvGrpSpPr>
-      <p:grpSpPr/>
+      <p:sp>
+        <p:nvSpPr>
+          <p:cNvPr id="28" name="Rectangles 27"/>
+          <p:cNvSpPr/>
+          <p:nvPr/>
+        </p:nvSpPr>
+        <p:spPr>
+          <a:xfrm>
+            <a:off x="3187700" y="1529715"/>
+            <a:ext cx="1249045" cy="399415"/>
+          </a:xfrm>
+          <a:prstGeom prst="rect">
+            <a:avLst/>
+          </a:prstGeom>
+        </p:spPr>
+        <p:style>
+          <a:lnRef idx="2">
+            <a:schemeClr val="accent1">
+              <a:shade val="50000"/>
+            </a:schemeClr>
+          </a:lnRef>
+          <a:fillRef idx="1">
+            <a:schemeClr val="accent1"/>
+          </a:fillRef>
+          <a:effectRef idx="0">
+            <a:schemeClr val="accent1"/>
+          </a:effectRef>
+          <a:fontRef idx="minor">
+            <a:schemeClr val="lt1"/>
+          </a:fontRef>
+        </p:style>
+        <p:txBody>
+          <a:bodyPr rtlCol="0" anchor="ctr"/>
+          <a:p>
+            <a:pPr algn="ctr"/>
+            <a:r>
+              <a:rPr lang="en-US" sz="1200"/>
+              <a:t>FECHA</a:t>
+            </a:r>
+            <a:endParaRPr lang="en-US" sz="1200"/>
+          </a:p>
+        </p:txBody>
+      </p:sp>
+      <p:cxnSp>
+        <p:nvCxnSpPr>
+          <p:cNvPr id="32" name="Straight Connector 31"/>
+          <p:cNvCxnSpPr>
+            <a:stCxn id="12" idx="2"/>
+            <a:endCxn id="28" idx="0"/>
+          </p:cNvCxnSpPr>
+          <p:nvPr/>
+        </p:nvCxnSpPr>
+        <p:spPr>
+          <a:xfrm>
+            <a:off x="3812540" y="1253490"/>
+            <a:ext cx="0" cy="276225"/>
+          </a:xfrm>
+          <a:prstGeom prst="line">
+            <a:avLst/>
+          </a:prstGeom>
+          <a:ln w="28575" cmpd="sng">
+            <a:solidFill>
+              <a:schemeClr val="accent2"/>
+            </a:solidFill>
+            <a:prstDash val="solid"/>
+          </a:ln>
+        </p:spPr>
+        <p:style>
+          <a:lnRef idx="1">
+            <a:schemeClr val="accent1"/>
+          </a:lnRef>
+          <a:fillRef idx="0">
+            <a:schemeClr val="accent1"/>
+          </a:fillRef>
+          <a:effectRef idx="0">
+            <a:schemeClr val="accent1"/>
+          </a:effectRef>
+          <a:fontRef idx="minor">
+            <a:schemeClr val="tx1"/>
+          </a:fontRef>
+        </p:style>
+      </p:cxnSp>
+      <p:sp>
+        <p:nvSpPr>
+          <p:cNvPr id="61" name="Text Box 60"/>
+          <p:cNvSpPr txBox="1"/>
+          <p:nvPr/>
+        </p:nvSpPr>
+        <p:spPr>
+          <a:xfrm>
+            <a:off x="3812540" y="1297305"/>
+            <a:ext cx="374650" cy="275590"/>
+          </a:xfrm>
+          <a:prstGeom prst="rect">
+            <a:avLst/>
+          </a:prstGeom>
+          <a:noFill/>
+        </p:spPr>
+        <p:txBody>
+          <a:bodyPr wrap="none" rtlCol="0">
+            <a:spAutoFit/>
+          </a:bodyPr>
+          <a:p>
+            <a:r>
+              <a:rPr lang="en-US" sz="1200"/>
+              <a:t>0,*</a:t>
+            </a:r>
+            <a:endParaRPr lang="en-US" sz="1200"/>
+          </a:p>
+        </p:txBody>
+      </p:sp>
     </p:spTree>
   </p:cSld>
   <p:clrMapOvr>

</xml_diff>